<commit_message>
powerpoint update once again
</commit_message>
<xml_diff>
--- a/public/pdf/demo.pptx
+++ b/public/pdf/demo.pptx
@@ -3615,7 +3615,7 @@
     <p:bg>
       <p:bgPr>
         <a:solidFill>
-          <a:srgbClr val="42D44C"/>
+          <a:srgbClr val="D47434"/>
         </a:solidFill>
         <a:effectLst/>
       </p:bgPr>
@@ -3706,7 +3706,7 @@
       </p:grpSpPr>
       <p:pic>
         <p:nvPicPr>
-          <p:cNvPr id="6" name="Picture 5" descr="gfhdjhkgjk.png"/>
+          <p:cNvPr id="2" name="Picture 1" descr="photo pricing.png"/>
           <p:cNvPicPr>
             <a:picLocks noChangeAspect="1"/>
           </p:cNvPicPr>
@@ -3726,8 +3726,8 @@
         </p:blipFill>
         <p:spPr>
           <a:xfrm>
-            <a:off x="760552" y="1819535"/>
-            <a:ext cx="16667814" cy="7324869"/>
+            <a:off x="848945" y="1773167"/>
+            <a:ext cx="16326895" cy="7175049"/>
           </a:xfrm>
           <a:prstGeom prst="rect">
             <a:avLst/>

</xml_diff>